<commit_message>
added some PPT files
</commit_message>
<xml_diff>
--- a/public/pptx/jesus_we_enthrone_you.pptx
+++ b/public/pptx/jesus_we_enthrone_you.pptx
@@ -1,8 +1,8 @@
 
 <file path=ppt/presentation.xml><?xml version="1.0" encoding="utf-8"?>
-<p:presentation xmlns:a="http://schemas.openxmlformats.org/drawingml/2006/main" xmlns:r="http://schemas.openxmlformats.org/officeDocument/2006/relationships" xmlns:p="http://schemas.openxmlformats.org/presentationml/2006/main" saveSubsetFonts="1">
+<p:presentation xmlns:a="http://schemas.openxmlformats.org/drawingml/2006/main" xmlns:r="http://schemas.openxmlformats.org/officeDocument/2006/relationships" xmlns:p="http://schemas.openxmlformats.org/presentationml/2006/main" saveSubsetFonts="1" autoCompressPictures="0">
   <p:sldMasterIdLst>
-    <p:sldMasterId id="2147483660" r:id="rId1"/>
+    <p:sldMasterId id="2147483670" r:id="rId1"/>
   </p:sldMasterIdLst>
   <p:sldIdLst>
     <p:sldId id="290" r:id="rId2"/>
@@ -108,22 +108,6 @@
       </a:defRPr>
     </a:lvl9pPr>
   </p:defaultTextStyle>
-  <p:extLst>
-    <p:ext uri="{EFAFB233-063F-42B5-8137-9DF3F51BA10A}">
-      <p15:sldGuideLst xmlns:p15="http://schemas.microsoft.com/office/powerpoint/2012/main">
-        <p15:guide id="1" orient="horz" pos="2160" userDrawn="1">
-          <p15:clr>
-            <a:srgbClr val="A4A3A4"/>
-          </p15:clr>
-        </p15:guide>
-        <p15:guide id="2" pos="3840" userDrawn="1">
-          <p15:clr>
-            <a:srgbClr val="A4A3A4"/>
-          </p15:clr>
-        </p15:guide>
-      </p15:sldGuideLst>
-    </p:ext>
-  </p:extLst>
 </p:presentation>
 </file>
 
@@ -238,7 +222,7 @@
     </p:spTree>
     <p:extLst>
       <p:ext uri="{BB962C8B-B14F-4D97-AF65-F5344CB8AC3E}">
-        <p14:creationId xmlns:p14="http://schemas.microsoft.com/office/powerpoint/2010/main" val="2339218412"/>
+        <p14:creationId xmlns:p14="http://schemas.microsoft.com/office/powerpoint/2010/main" val="884893222"/>
       </p:ext>
     </p:extLst>
   </p:cSld>
@@ -366,7 +350,7 @@
     </p:spTree>
     <p:extLst>
       <p:ext uri="{BB962C8B-B14F-4D97-AF65-F5344CB8AC3E}">
-        <p14:creationId xmlns:p14="http://schemas.microsoft.com/office/powerpoint/2010/main" val="333806075"/>
+        <p14:creationId xmlns:p14="http://schemas.microsoft.com/office/powerpoint/2010/main" val="2755709062"/>
       </p:ext>
     </p:extLst>
   </p:cSld>
@@ -504,7 +488,7 @@
     </p:spTree>
     <p:extLst>
       <p:ext uri="{BB962C8B-B14F-4D97-AF65-F5344CB8AC3E}">
-        <p14:creationId xmlns:p14="http://schemas.microsoft.com/office/powerpoint/2010/main" val="3688190842"/>
+        <p14:creationId xmlns:p14="http://schemas.microsoft.com/office/powerpoint/2010/main" val="165365306"/>
       </p:ext>
     </p:extLst>
   </p:cSld>
@@ -632,7 +616,7 @@
     </p:spTree>
     <p:extLst>
       <p:ext uri="{BB962C8B-B14F-4D97-AF65-F5344CB8AC3E}">
-        <p14:creationId xmlns:p14="http://schemas.microsoft.com/office/powerpoint/2010/main" val="4265207432"/>
+        <p14:creationId xmlns:p14="http://schemas.microsoft.com/office/powerpoint/2010/main" val="2901093520"/>
       </p:ext>
     </p:extLst>
   </p:cSld>
@@ -758,7 +742,7 @@
     </p:spTree>
     <p:extLst>
       <p:ext uri="{BB962C8B-B14F-4D97-AF65-F5344CB8AC3E}">
-        <p14:creationId xmlns:p14="http://schemas.microsoft.com/office/powerpoint/2010/main" val="2542012716"/>
+        <p14:creationId xmlns:p14="http://schemas.microsoft.com/office/powerpoint/2010/main" val="3866707694"/>
       </p:ext>
     </p:extLst>
   </p:cSld>
@@ -1002,7 +986,7 @@
     </p:spTree>
     <p:extLst>
       <p:ext uri="{BB962C8B-B14F-4D97-AF65-F5344CB8AC3E}">
-        <p14:creationId xmlns:p14="http://schemas.microsoft.com/office/powerpoint/2010/main" val="25088757"/>
+        <p14:creationId xmlns:p14="http://schemas.microsoft.com/office/powerpoint/2010/main" val="1140072923"/>
       </p:ext>
     </p:extLst>
   </p:cSld>
@@ -1385,7 +1369,7 @@
     </p:spTree>
     <p:extLst>
       <p:ext uri="{BB962C8B-B14F-4D97-AF65-F5344CB8AC3E}">
-        <p14:creationId xmlns:p14="http://schemas.microsoft.com/office/powerpoint/2010/main" val="4044446484"/>
+        <p14:creationId xmlns:p14="http://schemas.microsoft.com/office/powerpoint/2010/main" val="4061138496"/>
       </p:ext>
     </p:extLst>
   </p:cSld>
@@ -1437,7 +1421,7 @@
     </p:spTree>
     <p:extLst>
       <p:ext uri="{BB962C8B-B14F-4D97-AF65-F5344CB8AC3E}">
-        <p14:creationId xmlns:p14="http://schemas.microsoft.com/office/powerpoint/2010/main" val="3385564615"/>
+        <p14:creationId xmlns:p14="http://schemas.microsoft.com/office/powerpoint/2010/main" val="3606815130"/>
       </p:ext>
     </p:extLst>
   </p:cSld>
@@ -1467,7 +1451,7 @@
     </p:spTree>
     <p:extLst>
       <p:ext uri="{BB962C8B-B14F-4D97-AF65-F5344CB8AC3E}">
-        <p14:creationId xmlns:p14="http://schemas.microsoft.com/office/powerpoint/2010/main" val="1327959255"/>
+        <p14:creationId xmlns:p14="http://schemas.microsoft.com/office/powerpoint/2010/main" val="415478177"/>
       </p:ext>
     </p:extLst>
   </p:cSld>
@@ -1689,7 +1673,7 @@
     </p:spTree>
     <p:extLst>
       <p:ext uri="{BB962C8B-B14F-4D97-AF65-F5344CB8AC3E}">
-        <p14:creationId xmlns:p14="http://schemas.microsoft.com/office/powerpoint/2010/main" val="1071299142"/>
+        <p14:creationId xmlns:p14="http://schemas.microsoft.com/office/powerpoint/2010/main" val="57905855"/>
       </p:ext>
     </p:extLst>
   </p:cSld>
@@ -1877,7 +1861,7 @@
     </p:spTree>
     <p:extLst>
       <p:ext uri="{BB962C8B-B14F-4D97-AF65-F5344CB8AC3E}">
-        <p14:creationId xmlns:p14="http://schemas.microsoft.com/office/powerpoint/2010/main" val="2994268048"/>
+        <p14:creationId xmlns:p14="http://schemas.microsoft.com/office/powerpoint/2010/main" val="3145681699"/>
       </p:ext>
     </p:extLst>
   </p:cSld>
@@ -2031,23 +2015,23 @@
     </p:spTree>
     <p:extLst>
       <p:ext uri="{BB962C8B-B14F-4D97-AF65-F5344CB8AC3E}">
-        <p14:creationId xmlns:p14="http://schemas.microsoft.com/office/powerpoint/2010/main" val="989848354"/>
+        <p14:creationId xmlns:p14="http://schemas.microsoft.com/office/powerpoint/2010/main" val="1475639247"/>
       </p:ext>
     </p:extLst>
   </p:cSld>
   <p:clrMap bg1="lt1" tx1="dk1" bg2="lt2" tx2="dk2" accent1="accent1" accent2="accent2" accent3="accent3" accent4="accent4" accent5="accent5" accent6="accent6" hlink="hlink" folHlink="folHlink"/>
   <p:sldLayoutIdLst>
-    <p:sldLayoutId id="2147483661" r:id="rId1"/>
-    <p:sldLayoutId id="2147483662" r:id="rId2"/>
-    <p:sldLayoutId id="2147483663" r:id="rId3"/>
-    <p:sldLayoutId id="2147483664" r:id="rId4"/>
-    <p:sldLayoutId id="2147483665" r:id="rId5"/>
-    <p:sldLayoutId id="2147483666" r:id="rId6"/>
-    <p:sldLayoutId id="2147483667" r:id="rId7"/>
-    <p:sldLayoutId id="2147483668" r:id="rId8"/>
-    <p:sldLayoutId id="2147483669" r:id="rId9"/>
-    <p:sldLayoutId id="2147483670" r:id="rId10"/>
-    <p:sldLayoutId id="2147483671" r:id="rId11"/>
+    <p:sldLayoutId id="2147483671" r:id="rId1"/>
+    <p:sldLayoutId id="2147483672" r:id="rId2"/>
+    <p:sldLayoutId id="2147483673" r:id="rId3"/>
+    <p:sldLayoutId id="2147483674" r:id="rId4"/>
+    <p:sldLayoutId id="2147483675" r:id="rId5"/>
+    <p:sldLayoutId id="2147483676" r:id="rId6"/>
+    <p:sldLayoutId id="2147483677" r:id="rId7"/>
+    <p:sldLayoutId id="2147483678" r:id="rId8"/>
+    <p:sldLayoutId id="2147483679" r:id="rId9"/>
+    <p:sldLayoutId id="2147483680" r:id="rId10"/>
+    <p:sldLayoutId id="2147483681" r:id="rId11"/>
   </p:sldLayoutIdLst>
   <p:txStyles>
     <p:titleStyle>

</xml_diff>